<commit_message>
Deploying to gh-pages from @ w4bo/slides-markdown@5ffc620721c7f2e08da49fa862785a9bd553458f 🚀
</commit_message>
<xml_diff>
--- a/prova.pptx
+++ b/prova.pptx
@@ -14,6 +14,7 @@
     <p:sldId id="262" r:id="rId8"/>
     <p:sldId id="263" r:id="rId9"/>
     <p:sldId id="264" r:id="rId10"/>
+    <p:sldId id="265" r:id="rId11"/>
   </p:sldIdLst>
   <p:sldSz cx="9144000" cy="5143500" type="screen16x9"/>
   <p:notesSz cx="6858000" cy="9144000"/>
@@ -3194,6 +3195,96 @@
 </p:sld>
 </file>
 
+<file path=ppt/slides/slide10.xml><?xml version="1.0" encoding="utf-8"?>
+<p:sld xmlns:a="http://schemas.openxmlformats.org/drawingml/2006/main" xmlns:r="http://schemas.openxmlformats.org/officeDocument/2006/relationships" xmlns:p="http://schemas.openxmlformats.org/presentationml/2006/main">
+  <p:cSld>
+    <p:spTree>
+      <p:nvGrpSpPr>
+        <p:cNvPr id="1" name=""/>
+        <p:cNvGrpSpPr/>
+        <p:nvPr/>
+      </p:nvGrpSpPr>
+      <p:grpSpPr>
+        <a:xfrm>
+          <a:off x="0" y="0"/>
+          <a:ext cx="0" cy="0"/>
+          <a:chOff x="0" y="0"/>
+          <a:chExt cx="0" cy="0"/>
+        </a:xfrm>
+      </p:grpSpPr>
+      <p:sp>
+        <p:nvSpPr>
+          <p:cNvPr id="2" name="Title 1"/>
+          <p:cNvSpPr>
+            <a:spLocks noGrp="1"/>
+          </p:cNvSpPr>
+          <p:nvPr>
+            <p:ph type="title"/>
+          </p:nvPr>
+        </p:nvSpPr>
+        <p:spPr/>
+        <p:txBody>
+          <a:bodyPr/>
+          <a:lstStyle/>
+          <a:p>
+            <a:pPr lvl="0" indent="0" marL="0">
+              <a:buNone/>
+            </a:pPr>
+            <a:r>
+              <a:rPr/>
+              <a:t>References</a:t>
+            </a:r>
+          </a:p>
+        </p:txBody>
+      </p:sp>
+      <p:sp>
+        <p:nvSpPr>
+          <p:cNvPr id="3" name="Content Placeholder 2"/>
+          <p:cNvSpPr>
+            <a:spLocks noGrp="1"/>
+          </p:cNvSpPr>
+          <p:nvPr>
+            <p:ph idx="1"/>
+          </p:nvPr>
+        </p:nvSpPr>
+        <p:spPr/>
+        <p:txBody>
+          <a:bodyPr/>
+          <a:lstStyle/>
+          <a:p>
+            <a:pPr lvl="0" indent="0" marL="0">
+              <a:buNone/>
+            </a:pPr>
+            <a:r>
+              <a:rPr/>
+              <a:t>Francia, Matteo, Enrico Gallinucci, and Matteo Golfarelli. 2024. “Colossal Trajectory Mining: A Unifying Approach to Mine Behavioral Mobility Patterns.” </a:t>
+            </a:r>
+            <a:r>
+              <a:rPr i="1"/>
+              <a:t>Expert Syst. Appl.</a:t>
+            </a:r>
+            <a:r>
+              <a:rPr/>
+              <a:t> 238 (Part E): 122055. </a:t>
+            </a:r>
+            <a:r>
+              <a:rPr>
+                <a:hlinkClick r:id="rId2"/>
+              </a:rPr>
+              <a:t>https://doi.org/10.1016/J.ESWA.2023.122055</a:t>
+            </a:r>
+            <a:r>
+              <a:rPr/>
+              <a:t>.</a:t>
+            </a:r>
+          </a:p>
+        </p:txBody>
+      </p:sp>
+    </p:spTree>
+  </p:cSld>
+</p:sld>
+</file>
+
 <file path=ppt/slides/slide2.xml><?xml version="1.0" encoding="utf-8"?>
 <p:sld xmlns:a="http://schemas.openxmlformats.org/drawingml/2006/main" xmlns:r="http://schemas.openxmlformats.org/officeDocument/2006/relationships" xmlns:p="http://schemas.openxmlformats.org/presentationml/2006/main">
   <p:cSld>
@@ -3256,7 +3347,7 @@
             </a:pPr>
             <a:r>
               <a:rPr/>
-              <a:t>Left column</a:t>
+              <a:t>Left column (Francia, Gallinucci, and Golfarelli 2024)</a:t>
             </a:r>
           </a:p>
         </p:txBody>

</xml_diff>

<commit_message>
Deploying to gh-pages from @ w4bo/slides-markdown@2ecc126221ca42bb4534a87f72ae4fb1eaabeec1 🚀
</commit_message>
<xml_diff>
--- a/prova.pptx
+++ b/prova.pptx
@@ -3571,6 +3571,66 @@
             <a:r>
               <a:rPr/>
               <a:t>Bbb</a:t>
+            </a:r>
+          </a:p>
+        </p:txBody>
+      </p:sp>
+      <p:pic>
+        <p:nvPicPr>
+          <p:cNvPr descr="https://github.com/w4bo/img-dump/assets/18005592/edb97112-e9bb-45f8-8f2c-3121ebd80b7d.png" id="0" name="Picture 1"/>
+          <p:cNvPicPr>
+            <a:picLocks noGrp="1" noChangeAspect="1"/>
+          </p:cNvPicPr>
+          <p:nvPr/>
+        </p:nvPicPr>
+        <p:blipFill>
+          <a:blip r:embed="rId2"/>
+          <a:stretch>
+            <a:fillRect/>
+          </a:stretch>
+        </p:blipFill>
+        <p:spPr bwMode="auto">
+          <a:xfrm>
+            <a:off x="2413000" y="1193800"/>
+            <a:ext cx="4318000" cy="2882900"/>
+          </a:xfrm>
+          <a:prstGeom prst="rect">
+            <a:avLst/>
+          </a:prstGeom>
+          <a:noFill/>
+          <a:ln w="9525">
+            <a:noFill/>
+            <a:headEnd/>
+            <a:tailEnd/>
+          </a:ln>
+        </p:spPr>
+      </p:pic>
+      <p:sp>
+        <p:nvSpPr>
+          <p:cNvPr id="1" name="TextBox 3"/>
+          <p:cNvSpPr txBox="1"/>
+          <p:nvPr/>
+        </p:nvSpPr>
+        <p:spPr>
+          <a:xfrm>
+            <a:off x="457200" y="4076700"/>
+            <a:ext cx="8229600" cy="508000"/>
+          </a:xfrm>
+          <a:prstGeom prst="rect">
+            <a:avLst/>
+          </a:prstGeom>
+          <a:noFill/>
+        </p:spPr>
+        <p:txBody>
+          <a:bodyPr/>
+          <a:lstStyle/>
+          <a:p>
+            <a:pPr lvl="0" indent="0" marL="0" algn="ctr">
+              <a:buNone/>
+            </a:pPr>
+            <a:r>
+              <a:rPr/>
+              <a:t>immagine</a:t>
             </a:r>
           </a:p>
         </p:txBody>

</xml_diff>

<commit_message>
Deploying to gh-pages from @ w4bo/slides-markdown@8a9455714a3b47ff63206c373abf9f5c8978db61 🚀
</commit_message>
<xml_diff>
--- a/prova.pptx
+++ b/prova.pptx
@@ -15,6 +15,7 @@
     <p:sldId id="263" r:id="rId9"/>
     <p:sldId id="264" r:id="rId10"/>
     <p:sldId id="265" r:id="rId11"/>
+    <p:sldId id="266" r:id="rId12"/>
   </p:sldIdLst>
   <p:sldSz cx="9144000" cy="5143500" type="screen16x9"/>
   <p:notesSz cx="6858000" cy="9144000"/>
@@ -3124,7 +3125,7 @@
             </a:pPr>
             <a:r>
               <a:rPr/>
-              <a:t>Title</a:t>
+              <a:t>Embedded</a:t>
             </a:r>
           </a:p>
         </p:txBody>
@@ -3196,6 +3197,326 @@
 </file>
 
 <file path=ppt/slides/slide10.xml><?xml version="1.0" encoding="utf-8"?>
+<p:sld xmlns:a="http://schemas.openxmlformats.org/drawingml/2006/main" xmlns:r="http://schemas.openxmlformats.org/officeDocument/2006/relationships" xmlns:p="http://schemas.openxmlformats.org/presentationml/2006/main">
+  <p:cSld>
+    <p:spTree>
+      <p:nvGrpSpPr>
+        <p:cNvPr id="1" name=""/>
+        <p:cNvGrpSpPr/>
+        <p:nvPr/>
+      </p:nvGrpSpPr>
+      <p:grpSpPr>
+        <a:xfrm>
+          <a:off x="0" y="0"/>
+          <a:ext cx="0" cy="0"/>
+          <a:chOff x="0" y="0"/>
+          <a:chExt cx="0" cy="0"/>
+        </a:xfrm>
+      </p:grpSpPr>
+      <p:sp>
+        <p:nvSpPr>
+          <p:cNvPr id="2" name="Title 1"/>
+          <p:cNvSpPr>
+            <a:spLocks noGrp="1"/>
+          </p:cNvSpPr>
+          <p:nvPr>
+            <p:ph type="title"/>
+          </p:nvPr>
+        </p:nvSpPr>
+        <p:spPr/>
+        <p:txBody>
+          <a:bodyPr/>
+          <a:lstStyle/>
+          <a:p>
+            <a:pPr lvl="0" indent="0" marL="0">
+              <a:buNone/>
+            </a:pPr>
+            <a:r>
+              <a:rPr/>
+              <a:t>Some other slides</a:t>
+            </a:r>
+          </a:p>
+        </p:txBody>
+      </p:sp>
+      <p:sp>
+        <p:nvSpPr>
+          <p:cNvPr id="3" name="Content Placeholder 2"/>
+          <p:cNvSpPr>
+            <a:spLocks noGrp="1"/>
+          </p:cNvSpPr>
+          <p:nvPr>
+            <p:ph idx="1"/>
+          </p:nvPr>
+        </p:nvSpPr>
+        <p:spPr/>
+        <p:txBody>
+          <a:bodyPr/>
+          <a:lstStyle/>
+          <a:p>
+            <a:pPr lvl="0" indent="0">
+              <a:buNone/>
+            </a:pPr>
+            <a:r>
+              <a:rPr b="1">
+                <a:solidFill>
+                  <a:srgbClr val="007020"/>
+                </a:solidFill>
+                <a:latin typeface="Courier"/>
+              </a:rPr>
+              <a:t>let</a:t>
+            </a:r>
+            <a:r>
+              <a:rPr>
+                <a:latin typeface="Courier"/>
+              </a:rPr>
+              <a:t> a </a:t>
+            </a:r>
+            <a:r>
+              <a:rPr>
+                <a:solidFill>
+                  <a:srgbClr val="666666"/>
+                </a:solidFill>
+                <a:latin typeface="Courier"/>
+              </a:rPr>
+              <a:t>=</a:t>
+            </a:r>
+            <a:r>
+              <a:rPr>
+                <a:latin typeface="Courier"/>
+              </a:rPr>
+              <a:t> </a:t>
+            </a:r>
+            <a:r>
+              <a:rPr>
+                <a:solidFill>
+                  <a:srgbClr val="40A070"/>
+                </a:solidFill>
+                <a:latin typeface="Courier"/>
+              </a:rPr>
+              <a:t>1</a:t>
+            </a:r>
+            <a:r>
+              <a:rPr>
+                <a:solidFill>
+                  <a:srgbClr val="666666"/>
+                </a:solidFill>
+                <a:latin typeface="Courier"/>
+              </a:rPr>
+              <a:t>;</a:t>
+            </a:r>
+            <a:br/>
+            <a:r>
+              <a:rPr b="1">
+                <a:solidFill>
+                  <a:srgbClr val="007020"/>
+                </a:solidFill>
+                <a:latin typeface="Courier"/>
+              </a:rPr>
+              <a:t>let</a:t>
+            </a:r>
+            <a:r>
+              <a:rPr>
+                <a:latin typeface="Courier"/>
+              </a:rPr>
+              <a:t> b </a:t>
+            </a:r>
+            <a:r>
+              <a:rPr>
+                <a:solidFill>
+                  <a:srgbClr val="666666"/>
+                </a:solidFill>
+                <a:latin typeface="Courier"/>
+              </a:rPr>
+              <a:t>=</a:t>
+            </a:r>
+            <a:r>
+              <a:rPr>
+                <a:latin typeface="Courier"/>
+              </a:rPr>
+              <a:t> </a:t>
+            </a:r>
+            <a:r>
+              <a:rPr>
+                <a:solidFill>
+                  <a:srgbClr val="40A070"/>
+                </a:solidFill>
+                <a:latin typeface="Courier"/>
+              </a:rPr>
+              <a:t>2</a:t>
+            </a:r>
+            <a:r>
+              <a:rPr>
+                <a:solidFill>
+                  <a:srgbClr val="666666"/>
+                </a:solidFill>
+                <a:latin typeface="Courier"/>
+              </a:rPr>
+              <a:t>;</a:t>
+            </a:r>
+            <a:br/>
+            <a:r>
+              <a:rPr b="1">
+                <a:solidFill>
+                  <a:srgbClr val="007020"/>
+                </a:solidFill>
+                <a:latin typeface="Courier"/>
+              </a:rPr>
+              <a:t>let</a:t>
+            </a:r>
+            <a:r>
+              <a:rPr>
+                <a:latin typeface="Courier"/>
+              </a:rPr>
+              <a:t> c </a:t>
+            </a:r>
+            <a:r>
+              <a:rPr>
+                <a:solidFill>
+                  <a:srgbClr val="666666"/>
+                </a:solidFill>
+                <a:latin typeface="Courier"/>
+              </a:rPr>
+              <a:t>=</a:t>
+            </a:r>
+            <a:r>
+              <a:rPr>
+                <a:latin typeface="Courier"/>
+              </a:rPr>
+              <a:t> x </a:t>
+            </a:r>
+            <a:r>
+              <a:rPr b="1">
+                <a:solidFill>
+                  <a:srgbClr val="007020"/>
+                </a:solidFill>
+                <a:latin typeface="Courier"/>
+              </a:rPr>
+              <a:t>=&gt;</a:t>
+            </a:r>
+            <a:r>
+              <a:rPr>
+                <a:latin typeface="Courier"/>
+              </a:rPr>
+              <a:t> </a:t>
+            </a:r>
+            <a:r>
+              <a:rPr>
+                <a:solidFill>
+                  <a:srgbClr val="40A070"/>
+                </a:solidFill>
+                <a:latin typeface="Courier"/>
+              </a:rPr>
+              <a:t>1</a:t>
+            </a:r>
+            <a:r>
+              <a:rPr>
+                <a:latin typeface="Courier"/>
+              </a:rPr>
+              <a:t> </a:t>
+            </a:r>
+            <a:r>
+              <a:rPr>
+                <a:solidFill>
+                  <a:srgbClr val="666666"/>
+                </a:solidFill>
+                <a:latin typeface="Courier"/>
+              </a:rPr>
+              <a:t>+</a:t>
+            </a:r>
+            <a:r>
+              <a:rPr>
+                <a:latin typeface="Courier"/>
+              </a:rPr>
+              <a:t> </a:t>
+            </a:r>
+            <a:r>
+              <a:rPr>
+                <a:solidFill>
+                  <a:srgbClr val="40A070"/>
+                </a:solidFill>
+                <a:latin typeface="Courier"/>
+              </a:rPr>
+              <a:t>2</a:t>
+            </a:r>
+            <a:r>
+              <a:rPr>
+                <a:latin typeface="Courier"/>
+              </a:rPr>
+              <a:t> </a:t>
+            </a:r>
+            <a:r>
+              <a:rPr>
+                <a:solidFill>
+                  <a:srgbClr val="666666"/>
+                </a:solidFill>
+                <a:latin typeface="Courier"/>
+              </a:rPr>
+              <a:t>+</a:t>
+            </a:r>
+            <a:r>
+              <a:rPr>
+                <a:latin typeface="Courier"/>
+              </a:rPr>
+              <a:t> x</a:t>
+            </a:r>
+            <a:r>
+              <a:rPr>
+                <a:solidFill>
+                  <a:srgbClr val="666666"/>
+                </a:solidFill>
+                <a:latin typeface="Courier"/>
+              </a:rPr>
+              <a:t>;</a:t>
+            </a:r>
+            <a:br/>
+            <a:r>
+              <a:rPr>
+                <a:solidFill>
+                  <a:srgbClr val="06287E"/>
+                </a:solidFill>
+                <a:latin typeface="Courier"/>
+              </a:rPr>
+              <a:t>c</a:t>
+            </a:r>
+            <a:r>
+              <a:rPr>
+                <a:latin typeface="Courier"/>
+              </a:rPr>
+              <a:t>(</a:t>
+            </a:r>
+            <a:r>
+              <a:rPr>
+                <a:solidFill>
+                  <a:srgbClr val="40A070"/>
+                </a:solidFill>
+                <a:latin typeface="Courier"/>
+              </a:rPr>
+              <a:t>3</a:t>
+            </a:r>
+            <a:r>
+              <a:rPr>
+                <a:latin typeface="Courier"/>
+              </a:rPr>
+              <a:t>)</a:t>
+            </a:r>
+            <a:r>
+              <a:rPr>
+                <a:solidFill>
+                  <a:srgbClr val="666666"/>
+                </a:solidFill>
+                <a:latin typeface="Courier"/>
+              </a:rPr>
+              <a:t>;</a:t>
+            </a:r>
+          </a:p>
+        </p:txBody>
+      </p:sp>
+    </p:spTree>
+  </p:cSld>
+</p:sld>
+</file>
+
+<file path=ppt/slides/slide11.xml><?xml version="1.0" encoding="utf-8"?>
 <p:sld xmlns:a="http://schemas.openxmlformats.org/drawingml/2006/main" xmlns:r="http://schemas.openxmlformats.org/officeDocument/2006/relationships" xmlns:p="http://schemas.openxmlformats.org/presentationml/2006/main">
   <p:cSld>
     <p:spTree>
@@ -3540,6 +3861,78 @@
       </p:grpSpPr>
       <p:sp>
         <p:nvSpPr>
+          <p:cNvPr id="2" name="Title 1"/>
+          <p:cNvSpPr>
+            <a:spLocks noGrp="1"/>
+          </p:cNvSpPr>
+          <p:nvPr>
+            <p:ph type="title"/>
+          </p:nvPr>
+        </p:nvSpPr>
+        <p:spPr/>
+        <p:txBody>
+          <a:bodyPr/>
+          <a:lstStyle/>
+          <a:p>
+            <a:pPr lvl="0" indent="0" marL="0">
+              <a:buNone/>
+            </a:pPr>
+            <a:r>
+              <a:rPr/>
+              <a:t>This is embedded</a:t>
+            </a:r>
+          </a:p>
+        </p:txBody>
+      </p:sp>
+    </p:spTree>
+  </p:cSld>
+</p:sld>
+</file>
+
+<file path=ppt/slides/slide5.xml><?xml version="1.0" encoding="utf-8"?>
+<p:sld xmlns:a="http://schemas.openxmlformats.org/drawingml/2006/main" xmlns:r="http://schemas.openxmlformats.org/officeDocument/2006/relationships" xmlns:p="http://schemas.openxmlformats.org/presentationml/2006/main">
+  <p:cSld>
+    <p:spTree>
+      <p:nvGrpSpPr>
+        <p:cNvPr id="1" name=""/>
+        <p:cNvGrpSpPr/>
+        <p:nvPr/>
+      </p:nvGrpSpPr>
+      <p:grpSpPr>
+        <a:xfrm>
+          <a:off x="0" y="0"/>
+          <a:ext cx="0" cy="0"/>
+          <a:chOff x="0" y="0"/>
+          <a:chExt cx="0" cy="0"/>
+        </a:xfrm>
+      </p:grpSpPr>
+      <p:sp>
+        <p:nvSpPr>
+          <p:cNvPr id="2" name="Title 1"/>
+          <p:cNvSpPr>
+            <a:spLocks noGrp="1"/>
+          </p:cNvSpPr>
+          <p:nvPr>
+            <p:ph type="title"/>
+          </p:nvPr>
+        </p:nvSpPr>
+        <p:spPr/>
+        <p:txBody>
+          <a:bodyPr/>
+          <a:lstStyle/>
+          <a:p>
+            <a:pPr lvl="0" indent="0" marL="0">
+              <a:buNone/>
+            </a:pPr>
+            <a:r>
+              <a:rPr/>
+              <a:t>Main slide</a:t>
+            </a:r>
+          </a:p>
+        </p:txBody>
+      </p:sp>
+      <p:sp>
+        <p:nvSpPr>
           <p:cNvPr id="3" name="Content Placeholder 2"/>
           <p:cNvSpPr>
             <a:spLocks noGrp="1"/>
@@ -3552,6 +3945,15 @@
         <p:txBody>
           <a:bodyPr/>
           <a:lstStyle/>
+          <a:p>
+            <a:pPr lvl="0" indent="0" marL="0">
+              <a:buNone/>
+            </a:pPr>
+            <a:r>
+              <a:rPr/>
+              <a:t>Hi from embedded document</a:t>
+            </a:r>
+          </a:p>
           <a:p>
             <a:pPr lvl="0" indent="0" marL="0">
               <a:spcBef>
@@ -3640,86 +4042,6 @@
 </p:sld>
 </file>
 
-<file path=ppt/slides/slide5.xml><?xml version="1.0" encoding="utf-8"?>
-<p:sld xmlns:a="http://schemas.openxmlformats.org/drawingml/2006/main" xmlns:r="http://schemas.openxmlformats.org/officeDocument/2006/relationships" xmlns:p="http://schemas.openxmlformats.org/presentationml/2006/main">
-  <p:cSld>
-    <p:spTree>
-      <p:nvGrpSpPr>
-        <p:cNvPr id="1" name=""/>
-        <p:cNvGrpSpPr/>
-        <p:nvPr/>
-      </p:nvGrpSpPr>
-      <p:grpSpPr>
-        <a:xfrm>
-          <a:off x="0" y="0"/>
-          <a:ext cx="0" cy="0"/>
-          <a:chOff x="0" y="0"/>
-          <a:chExt cx="0" cy="0"/>
-        </a:xfrm>
-      </p:grpSpPr>
-      <p:sp>
-        <p:nvSpPr>
-          <p:cNvPr id="3" name="Content Placeholder 2"/>
-          <p:cNvSpPr>
-            <a:spLocks noGrp="1"/>
-          </p:cNvSpPr>
-          <p:nvPr>
-            <p:ph idx="1"/>
-          </p:nvPr>
-        </p:nvSpPr>
-        <p:spPr/>
-        <p:txBody>
-          <a:bodyPr/>
-          <a:lstStyle/>
-          <a:p>
-            <a:pPr lvl="0" indent="0" marL="0">
-              <a:spcBef>
-                <a:spcPts val="3000"/>
-              </a:spcBef>
-              <a:buNone/>
-            </a:pPr>
-            <a:r>
-              <a:rPr b="1"/>
-              <a:t>A Section</a:t>
-            </a:r>
-          </a:p>
-          <a:p>
-            <a:pPr lvl="0" indent="0" marL="0">
-              <a:buNone/>
-            </a:pPr>
-            <a:r>
-              <a:rPr/>
-              <a:t>Xxx</a:t>
-            </a:r>
-          </a:p>
-          <a:p>
-            <a:pPr lvl="0" indent="0" marL="0">
-              <a:spcBef>
-                <a:spcPts val="3000"/>
-              </a:spcBef>
-              <a:buNone/>
-            </a:pPr>
-            <a:r>
-              <a:rPr b="1"/>
-              <a:t>A subsection</a:t>
-            </a:r>
-          </a:p>
-          <a:p>
-            <a:pPr lvl="0" indent="0" marL="0">
-              <a:buNone/>
-            </a:pPr>
-            <a:r>
-              <a:rPr/>
-              <a:t>Ccc</a:t>
-            </a:r>
-          </a:p>
-        </p:txBody>
-      </p:sp>
-    </p:spTree>
-  </p:cSld>
-</p:sld>
-</file>
-
 <file path=ppt/slides/slide6.xml><?xml version="1.0" encoding="utf-8"?>
 <p:sld xmlns:a="http://schemas.openxmlformats.org/drawingml/2006/main" xmlns:r="http://schemas.openxmlformats.org/officeDocument/2006/relationships" xmlns:p="http://schemas.openxmlformats.org/presentationml/2006/main">
   <p:cSld>
@@ -3760,6 +4082,27 @@
             </a:pPr>
             <a:r>
               <a:rPr b="1"/>
+              <a:t>A Section</a:t>
+            </a:r>
+          </a:p>
+          <a:p>
+            <a:pPr lvl="0" indent="0" marL="0">
+              <a:buNone/>
+            </a:pPr>
+            <a:r>
+              <a:rPr/>
+              <a:t>Xxx</a:t>
+            </a:r>
+          </a:p>
+          <a:p>
+            <a:pPr lvl="0" indent="0" marL="0">
+              <a:spcBef>
+                <a:spcPts val="3000"/>
+              </a:spcBef>
+              <a:buNone/>
+            </a:pPr>
+            <a:r>
+              <a:rPr b="1"/>
               <a:t>A subsection</a:t>
             </a:r>
           </a:p>
@@ -3769,7 +4112,7 @@
             </a:pPr>
             <a:r>
               <a:rPr/>
-              <a:t>Yyy</a:t>
+              <a:t>Ccc</a:t>
             </a:r>
           </a:p>
         </p:txBody>
@@ -3819,7 +4162,7 @@
             </a:pPr>
             <a:r>
               <a:rPr b="1"/>
-              <a:t>A subsubsection</a:t>
+              <a:t>A subsection</a:t>
             </a:r>
           </a:p>
           <a:p>
@@ -3828,7 +4171,7 @@
             </a:pPr>
             <a:r>
               <a:rPr/>
-              <a:t>Ddd</a:t>
+              <a:t>Yyy</a:t>
             </a:r>
           </a:p>
         </p:txBody>
@@ -3878,7 +4221,7 @@
             </a:pPr>
             <a:r>
               <a:rPr b="1"/>
-              <a:t>A subsubsubsection</a:t>
+              <a:t>A subsubsection</a:t>
             </a:r>
           </a:p>
           <a:p>
@@ -3887,7 +4230,7 @@
             </a:pPr>
             <a:r>
               <a:rPr/>
-              <a:t>Eee</a:t>
+              <a:t>Ddd</a:t>
             </a:r>
           </a:p>
         </p:txBody>
@@ -3916,12 +4259,12 @@
       </p:grpSpPr>
       <p:sp>
         <p:nvSpPr>
-          <p:cNvPr id="2" name="Title 1"/>
-          <p:cNvSpPr>
-            <a:spLocks noGrp="1"/>
-          </p:cNvSpPr>
-          <p:nvPr>
-            <p:ph type="title"/>
+          <p:cNvPr id="3" name="Content Placeholder 2"/>
+          <p:cNvSpPr>
+            <a:spLocks noGrp="1"/>
+          </p:cNvSpPr>
+          <p:nvPr>
+            <p:ph idx="1"/>
           </p:nvPr>
         </p:nvSpPr>
         <p:spPr/>
@@ -3930,284 +4273,23 @@
           <a:lstStyle/>
           <a:p>
             <a:pPr lvl="0" indent="0" marL="0">
+              <a:spcBef>
+                <a:spcPts val="3000"/>
+              </a:spcBef>
               <a:buNone/>
             </a:pPr>
             <a:r>
+              <a:rPr b="1"/>
+              <a:t>A subsubsubsection</a:t>
+            </a:r>
+          </a:p>
+          <a:p>
+            <a:pPr lvl="0" indent="0" marL="0">
+              <a:buNone/>
+            </a:pPr>
+            <a:r>
               <a:rPr/>
-              <a:t>Some other slides</a:t>
-            </a:r>
-          </a:p>
-        </p:txBody>
-      </p:sp>
-      <p:sp>
-        <p:nvSpPr>
-          <p:cNvPr id="3" name="Content Placeholder 2"/>
-          <p:cNvSpPr>
-            <a:spLocks noGrp="1"/>
-          </p:cNvSpPr>
-          <p:nvPr>
-            <p:ph idx="1"/>
-          </p:nvPr>
-        </p:nvSpPr>
-        <p:spPr/>
-        <p:txBody>
-          <a:bodyPr/>
-          <a:lstStyle/>
-          <a:p>
-            <a:pPr lvl="0" indent="0">
-              <a:buNone/>
-            </a:pPr>
-            <a:r>
-              <a:rPr b="1">
-                <a:solidFill>
-                  <a:srgbClr val="007020"/>
-                </a:solidFill>
-                <a:latin typeface="Courier"/>
-              </a:rPr>
-              <a:t>let</a:t>
-            </a:r>
-            <a:r>
-              <a:rPr>
-                <a:latin typeface="Courier"/>
-              </a:rPr>
-              <a:t> a </a:t>
-            </a:r>
-            <a:r>
-              <a:rPr>
-                <a:solidFill>
-                  <a:srgbClr val="666666"/>
-                </a:solidFill>
-                <a:latin typeface="Courier"/>
-              </a:rPr>
-              <a:t>=</a:t>
-            </a:r>
-            <a:r>
-              <a:rPr>
-                <a:latin typeface="Courier"/>
-              </a:rPr>
-              <a:t> </a:t>
-            </a:r>
-            <a:r>
-              <a:rPr>
-                <a:solidFill>
-                  <a:srgbClr val="40A070"/>
-                </a:solidFill>
-                <a:latin typeface="Courier"/>
-              </a:rPr>
-              <a:t>1</a:t>
-            </a:r>
-            <a:r>
-              <a:rPr>
-                <a:solidFill>
-                  <a:srgbClr val="666666"/>
-                </a:solidFill>
-                <a:latin typeface="Courier"/>
-              </a:rPr>
-              <a:t>;</a:t>
-            </a:r>
-            <a:br/>
-            <a:r>
-              <a:rPr b="1">
-                <a:solidFill>
-                  <a:srgbClr val="007020"/>
-                </a:solidFill>
-                <a:latin typeface="Courier"/>
-              </a:rPr>
-              <a:t>let</a:t>
-            </a:r>
-            <a:r>
-              <a:rPr>
-                <a:latin typeface="Courier"/>
-              </a:rPr>
-              <a:t> b </a:t>
-            </a:r>
-            <a:r>
-              <a:rPr>
-                <a:solidFill>
-                  <a:srgbClr val="666666"/>
-                </a:solidFill>
-                <a:latin typeface="Courier"/>
-              </a:rPr>
-              <a:t>=</a:t>
-            </a:r>
-            <a:r>
-              <a:rPr>
-                <a:latin typeface="Courier"/>
-              </a:rPr>
-              <a:t> </a:t>
-            </a:r>
-            <a:r>
-              <a:rPr>
-                <a:solidFill>
-                  <a:srgbClr val="40A070"/>
-                </a:solidFill>
-                <a:latin typeface="Courier"/>
-              </a:rPr>
-              <a:t>2</a:t>
-            </a:r>
-            <a:r>
-              <a:rPr>
-                <a:solidFill>
-                  <a:srgbClr val="666666"/>
-                </a:solidFill>
-                <a:latin typeface="Courier"/>
-              </a:rPr>
-              <a:t>;</a:t>
-            </a:r>
-            <a:br/>
-            <a:r>
-              <a:rPr b="1">
-                <a:solidFill>
-                  <a:srgbClr val="007020"/>
-                </a:solidFill>
-                <a:latin typeface="Courier"/>
-              </a:rPr>
-              <a:t>let</a:t>
-            </a:r>
-            <a:r>
-              <a:rPr>
-                <a:latin typeface="Courier"/>
-              </a:rPr>
-              <a:t> c </a:t>
-            </a:r>
-            <a:r>
-              <a:rPr>
-                <a:solidFill>
-                  <a:srgbClr val="666666"/>
-                </a:solidFill>
-                <a:latin typeface="Courier"/>
-              </a:rPr>
-              <a:t>=</a:t>
-            </a:r>
-            <a:r>
-              <a:rPr>
-                <a:latin typeface="Courier"/>
-              </a:rPr>
-              <a:t> x </a:t>
-            </a:r>
-            <a:r>
-              <a:rPr b="1">
-                <a:solidFill>
-                  <a:srgbClr val="007020"/>
-                </a:solidFill>
-                <a:latin typeface="Courier"/>
-              </a:rPr>
-              <a:t>=&gt;</a:t>
-            </a:r>
-            <a:r>
-              <a:rPr>
-                <a:latin typeface="Courier"/>
-              </a:rPr>
-              <a:t> </a:t>
-            </a:r>
-            <a:r>
-              <a:rPr>
-                <a:solidFill>
-                  <a:srgbClr val="40A070"/>
-                </a:solidFill>
-                <a:latin typeface="Courier"/>
-              </a:rPr>
-              <a:t>1</a:t>
-            </a:r>
-            <a:r>
-              <a:rPr>
-                <a:latin typeface="Courier"/>
-              </a:rPr>
-              <a:t> </a:t>
-            </a:r>
-            <a:r>
-              <a:rPr>
-                <a:solidFill>
-                  <a:srgbClr val="666666"/>
-                </a:solidFill>
-                <a:latin typeface="Courier"/>
-              </a:rPr>
-              <a:t>+</a:t>
-            </a:r>
-            <a:r>
-              <a:rPr>
-                <a:latin typeface="Courier"/>
-              </a:rPr>
-              <a:t> </a:t>
-            </a:r>
-            <a:r>
-              <a:rPr>
-                <a:solidFill>
-                  <a:srgbClr val="40A070"/>
-                </a:solidFill>
-                <a:latin typeface="Courier"/>
-              </a:rPr>
-              <a:t>2</a:t>
-            </a:r>
-            <a:r>
-              <a:rPr>
-                <a:latin typeface="Courier"/>
-              </a:rPr>
-              <a:t> </a:t>
-            </a:r>
-            <a:r>
-              <a:rPr>
-                <a:solidFill>
-                  <a:srgbClr val="666666"/>
-                </a:solidFill>
-                <a:latin typeface="Courier"/>
-              </a:rPr>
-              <a:t>+</a:t>
-            </a:r>
-            <a:r>
-              <a:rPr>
-                <a:latin typeface="Courier"/>
-              </a:rPr>
-              <a:t> x</a:t>
-            </a:r>
-            <a:r>
-              <a:rPr>
-                <a:solidFill>
-                  <a:srgbClr val="666666"/>
-                </a:solidFill>
-                <a:latin typeface="Courier"/>
-              </a:rPr>
-              <a:t>;</a:t>
-            </a:r>
-            <a:br/>
-            <a:r>
-              <a:rPr>
-                <a:solidFill>
-                  <a:srgbClr val="06287E"/>
-                </a:solidFill>
-                <a:latin typeface="Courier"/>
-              </a:rPr>
-              <a:t>c</a:t>
-            </a:r>
-            <a:r>
-              <a:rPr>
-                <a:latin typeface="Courier"/>
-              </a:rPr>
-              <a:t>(</a:t>
-            </a:r>
-            <a:r>
-              <a:rPr>
-                <a:solidFill>
-                  <a:srgbClr val="40A070"/>
-                </a:solidFill>
-                <a:latin typeface="Courier"/>
-              </a:rPr>
-              <a:t>3</a:t>
-            </a:r>
-            <a:r>
-              <a:rPr>
-                <a:latin typeface="Courier"/>
-              </a:rPr>
-              <a:t>)</a:t>
-            </a:r>
-            <a:r>
-              <a:rPr>
-                <a:solidFill>
-                  <a:srgbClr val="666666"/>
-                </a:solidFill>
-                <a:latin typeface="Courier"/>
-              </a:rPr>
-              <a:t>;</a:t>
+              <a:t>Eee</a:t>
             </a:r>
           </a:p>
         </p:txBody>

</xml_diff>

<commit_message>
Deploying to gh-pages from @ w4bo/slides-markdown@ba7973b537188813484ef7ec9151590455a6e33e 🚀
</commit_message>
<xml_diff>
--- a/prova.pptx
+++ b/prova.pptx
@@ -167,11 +167,20 @@
           </a:xfrm>
         </p:spPr>
         <p:txBody>
-          <a:bodyPr/>
-          <a:lstStyle/>
-          <a:p>
-            <a:r>
-              <a:rPr lang="en-US"/>
+          <a:bodyPr>
+            <a:normAutofit/>
+          </a:bodyPr>
+          <a:lstStyle>
+            <a:lvl1pPr>
+              <a:defRPr sz="2800">
+                <a:latin typeface="Helvetica" panose="020B0604020202020204" pitchFamily="34" charset="0"/>
+                <a:cs typeface="Helvetica" panose="020B0604020202020204" pitchFamily="34" charset="0"/>
+              </a:defRPr>
+            </a:lvl1pPr>
+          </a:lstStyle>
+          <a:p>
+            <a:r>
+              <a:rPr lang="en-US" dirty="0"/>
               <a:t>Click to edit Master title style</a:t>
             </a:r>
           </a:p>
@@ -204,6 +213,8 @@
                     <a:tint val="75000"/>
                   </a:schemeClr>
                 </a:solidFill>
+                <a:latin typeface="Helvetica" panose="020B0604020202020204" pitchFamily="34" charset="0"/>
+                <a:cs typeface="Helvetica" panose="020B0604020202020204" pitchFamily="34" charset="0"/>
               </a:defRPr>
             </a:lvl1pPr>
             <a:lvl2pPr marL="342900" indent="0" algn="ctr">
@@ -308,11 +319,19 @@
         <p:spPr/>
         <p:txBody>
           <a:bodyPr/>
-          <a:lstStyle/>
+          <a:lstStyle>
+            <a:lvl1pPr>
+              <a:defRPr>
+                <a:latin typeface="Helvetica" panose="020B0604020202020204" pitchFamily="34" charset="0"/>
+                <a:cs typeface="Helvetica" panose="020B0604020202020204" pitchFamily="34" charset="0"/>
+              </a:defRPr>
+            </a:lvl1pPr>
+          </a:lstStyle>
           <a:p>
             <a:fld id="{241EB5C9-1307-BA42-ABA2-0BC069CD8E7F}" type="datetimeFigureOut">
               <a:rPr lang="en-US" smtClean="0"/>
-              <a:t>1/2/22</a:t>
+              <a:pPr/>
+              <a:t>2/25/2024</a:t>
             </a:fld>
             <a:endParaRPr lang="en-US"/>
           </a:p>
@@ -331,7 +350,14 @@
         <p:spPr/>
         <p:txBody>
           <a:bodyPr/>
-          <a:lstStyle/>
+          <a:lstStyle>
+            <a:lvl1pPr>
+              <a:defRPr>
+                <a:latin typeface="Helvetica" panose="020B0604020202020204" pitchFamily="34" charset="0"/>
+                <a:cs typeface="Helvetica" panose="020B0604020202020204" pitchFamily="34" charset="0"/>
+              </a:defRPr>
+            </a:lvl1pPr>
+          </a:lstStyle>
           <a:p>
             <a:endParaRPr lang="en-US"/>
           </a:p>
@@ -350,10 +376,18 @@
         <p:spPr/>
         <p:txBody>
           <a:bodyPr/>
-          <a:lstStyle/>
+          <a:lstStyle>
+            <a:lvl1pPr>
+              <a:defRPr>
+                <a:latin typeface="Helvetica" panose="020B0604020202020204" pitchFamily="34" charset="0"/>
+                <a:cs typeface="Helvetica" panose="020B0604020202020204" pitchFamily="34" charset="0"/>
+              </a:defRPr>
+            </a:lvl1pPr>
+          </a:lstStyle>
           <a:p>
             <a:fld id="{C5EF2332-01BF-834F-8236-50238282D533}" type="slidenum">
               <a:rPr lang="en-US" smtClean="0"/>
+              <a:pPr/>
               <a:t>‹#›</a:t>
             </a:fld>
             <a:endParaRPr lang="en-US"/>
@@ -480,7 +514,7 @@
           <a:p>
             <a:fld id="{241EB5C9-1307-BA42-ABA2-0BC069CD8E7F}" type="datetimeFigureOut">
               <a:rPr lang="en-US" smtClean="0"/>
-              <a:t>1/2/22</a:t>
+              <a:t>2/25/2024</a:t>
             </a:fld>
             <a:endParaRPr lang="en-US"/>
           </a:p>
@@ -658,7 +692,7 @@
           <a:p>
             <a:fld id="{241EB5C9-1307-BA42-ABA2-0BC069CD8E7F}" type="datetimeFigureOut">
               <a:rPr lang="en-US" smtClean="0"/>
-              <a:t>1/2/22</a:t>
+              <a:t>2/25/2024</a:t>
             </a:fld>
             <a:endParaRPr lang="en-US"/>
           </a:p>
@@ -826,7 +860,7 @@
           <a:p>
             <a:fld id="{241EB5C9-1307-BA42-ABA2-0BC069CD8E7F}" type="datetimeFigureOut">
               <a:rPr lang="en-US" smtClean="0"/>
-              <a:t>1/2/22</a:t>
+              <a:t>2/25/2024</a:t>
             </a:fld>
             <a:endParaRPr lang="en-US"/>
           </a:p>
@@ -921,15 +955,17 @@
           </a:xfrm>
         </p:spPr>
         <p:txBody>
-          <a:bodyPr anchor="t"/>
+          <a:bodyPr anchor="t">
+            <a:normAutofit/>
+          </a:bodyPr>
           <a:lstStyle>
             <a:lvl1pPr algn="l">
-              <a:defRPr sz="3000" b="1" cap="all"/>
+              <a:defRPr sz="2000" b="1" cap="all"/>
             </a:lvl1pPr>
           </a:lstStyle>
           <a:p>
             <a:r>
-              <a:rPr lang="en-US"/>
+              <a:rPr lang="en-US" dirty="0"/>
               <a:t>Click to edit Master title style</a:t>
             </a:r>
           </a:p>
@@ -1071,7 +1107,7 @@
           <a:p>
             <a:fld id="{241EB5C9-1307-BA42-ABA2-0BC069CD8E7F}" type="datetimeFigureOut">
               <a:rPr lang="en-US" smtClean="0"/>
-              <a:t>1/2/22</a:t>
+              <a:t>2/25/2024</a:t>
             </a:fld>
             <a:endParaRPr lang="en-US"/>
           </a:p>
@@ -1188,22 +1224,24 @@
           </a:xfrm>
         </p:spPr>
         <p:txBody>
-          <a:bodyPr/>
+          <a:bodyPr>
+            <a:normAutofit/>
+          </a:bodyPr>
           <a:lstStyle>
             <a:lvl1pPr>
-              <a:defRPr sz="2100"/>
+              <a:defRPr sz="1600"/>
             </a:lvl1pPr>
             <a:lvl2pPr>
-              <a:defRPr sz="1800"/>
+              <a:defRPr sz="1200"/>
             </a:lvl2pPr>
             <a:lvl3pPr>
-              <a:defRPr sz="1500"/>
+              <a:defRPr sz="1100"/>
             </a:lvl3pPr>
             <a:lvl4pPr>
-              <a:defRPr sz="1350"/>
+              <a:defRPr sz="1050"/>
             </a:lvl4pPr>
             <a:lvl5pPr>
-              <a:defRPr sz="1350"/>
+              <a:defRPr sz="1050"/>
             </a:lvl5pPr>
             <a:lvl6pPr>
               <a:defRPr sz="1350"/>
@@ -1221,35 +1259,35 @@
           <a:p>
             <a:pPr lvl="0"/>
             <a:r>
-              <a:rPr lang="en-US"/>
+              <a:rPr lang="en-US" dirty="0"/>
               <a:t>Click to edit Master text styles</a:t>
             </a:r>
           </a:p>
           <a:p>
             <a:pPr lvl="1"/>
             <a:r>
-              <a:rPr lang="en-US"/>
+              <a:rPr lang="en-US" dirty="0"/>
               <a:t>Second level</a:t>
             </a:r>
           </a:p>
           <a:p>
             <a:pPr lvl="2"/>
             <a:r>
-              <a:rPr lang="en-US"/>
+              <a:rPr lang="en-US" dirty="0"/>
               <a:t>Third level</a:t>
             </a:r>
           </a:p>
           <a:p>
             <a:pPr lvl="3"/>
             <a:r>
-              <a:rPr lang="en-US"/>
+              <a:rPr lang="en-US" dirty="0"/>
               <a:t>Fourth level</a:t>
             </a:r>
           </a:p>
           <a:p>
             <a:pPr lvl="4"/>
             <a:r>
-              <a:rPr lang="en-US"/>
+              <a:rPr lang="en-US" dirty="0"/>
               <a:t>Fifth level</a:t>
             </a:r>
           </a:p>
@@ -1272,22 +1310,24 @@
           </a:xfrm>
         </p:spPr>
         <p:txBody>
-          <a:bodyPr/>
+          <a:bodyPr>
+            <a:normAutofit/>
+          </a:bodyPr>
           <a:lstStyle>
             <a:lvl1pPr>
-              <a:defRPr sz="2100"/>
+              <a:defRPr sz="1400"/>
             </a:lvl1pPr>
             <a:lvl2pPr>
-              <a:defRPr sz="1800"/>
+              <a:defRPr sz="1100"/>
             </a:lvl2pPr>
             <a:lvl3pPr>
-              <a:defRPr sz="1500"/>
+              <a:defRPr sz="1050"/>
             </a:lvl3pPr>
             <a:lvl4pPr>
-              <a:defRPr sz="1350"/>
+              <a:defRPr sz="1000"/>
             </a:lvl4pPr>
             <a:lvl5pPr>
-              <a:defRPr sz="1350"/>
+              <a:defRPr sz="1000"/>
             </a:lvl5pPr>
             <a:lvl6pPr>
               <a:defRPr sz="1350"/>
@@ -1305,35 +1345,35 @@
           <a:p>
             <a:pPr lvl="0"/>
             <a:r>
-              <a:rPr lang="en-US"/>
+              <a:rPr lang="en-US" dirty="0"/>
               <a:t>Click to edit Master text styles</a:t>
             </a:r>
           </a:p>
           <a:p>
             <a:pPr lvl="1"/>
             <a:r>
-              <a:rPr lang="en-US"/>
+              <a:rPr lang="en-US" dirty="0"/>
               <a:t>Second level</a:t>
             </a:r>
           </a:p>
           <a:p>
             <a:pPr lvl="2"/>
             <a:r>
-              <a:rPr lang="en-US"/>
+              <a:rPr lang="en-US" dirty="0"/>
               <a:t>Third level</a:t>
             </a:r>
           </a:p>
           <a:p>
             <a:pPr lvl="3"/>
             <a:r>
-              <a:rPr lang="en-US"/>
+              <a:rPr lang="en-US" dirty="0"/>
               <a:t>Fourth level</a:t>
             </a:r>
           </a:p>
           <a:p>
             <a:pPr lvl="4"/>
             <a:r>
-              <a:rPr lang="en-US"/>
+              <a:rPr lang="en-US" dirty="0"/>
               <a:t>Fifth level</a:t>
             </a:r>
           </a:p>
@@ -1356,7 +1396,7 @@
           <a:p>
             <a:fld id="{241EB5C9-1307-BA42-ABA2-0BC069CD8E7F}" type="datetimeFigureOut">
               <a:rPr lang="en-US" smtClean="0"/>
-              <a:t>1/2/22</a:t>
+              <a:t>2/25/2024</a:t>
             </a:fld>
             <a:endParaRPr lang="en-US"/>
           </a:p>
@@ -1477,11 +1517,13 @@
           </a:xfrm>
         </p:spPr>
         <p:txBody>
-          <a:bodyPr anchor="b"/>
+          <a:bodyPr anchor="b">
+            <a:normAutofit/>
+          </a:bodyPr>
           <a:lstStyle>
             <a:lvl1pPr marL="0" indent="0">
               <a:buNone/>
-              <a:defRPr sz="1800" b="1"/>
+              <a:defRPr sz="1600" b="1"/>
             </a:lvl1pPr>
             <a:lvl2pPr marL="342900" indent="0">
               <a:buNone/>
@@ -1519,7 +1561,7 @@
           <a:p>
             <a:pPr lvl="0"/>
             <a:r>
-              <a:rPr lang="en-US"/>
+              <a:rPr lang="en-US" dirty="0"/>
               <a:t>Click to edit Master text styles</a:t>
             </a:r>
           </a:p>
@@ -1542,22 +1584,24 @@
           </a:xfrm>
         </p:spPr>
         <p:txBody>
-          <a:bodyPr/>
+          <a:bodyPr>
+            <a:normAutofit/>
+          </a:bodyPr>
           <a:lstStyle>
             <a:lvl1pPr>
-              <a:defRPr sz="1800"/>
+              <a:defRPr sz="1400"/>
             </a:lvl1pPr>
             <a:lvl2pPr>
-              <a:defRPr sz="1500"/>
+              <a:defRPr sz="1200"/>
             </a:lvl2pPr>
             <a:lvl3pPr>
-              <a:defRPr sz="1350"/>
+              <a:defRPr sz="1100"/>
             </a:lvl3pPr>
             <a:lvl4pPr>
-              <a:defRPr sz="1200"/>
+              <a:defRPr sz="1050"/>
             </a:lvl4pPr>
             <a:lvl5pPr>
-              <a:defRPr sz="1200"/>
+              <a:defRPr sz="1050"/>
             </a:lvl5pPr>
             <a:lvl6pPr>
               <a:defRPr sz="1200"/>
@@ -1575,35 +1619,35 @@
           <a:p>
             <a:pPr lvl="0"/>
             <a:r>
-              <a:rPr lang="en-US"/>
+              <a:rPr lang="en-US" dirty="0"/>
               <a:t>Click to edit Master text styles</a:t>
             </a:r>
           </a:p>
           <a:p>
             <a:pPr lvl="1"/>
             <a:r>
-              <a:rPr lang="en-US"/>
+              <a:rPr lang="en-US" dirty="0"/>
               <a:t>Second level</a:t>
             </a:r>
           </a:p>
           <a:p>
             <a:pPr lvl="2"/>
             <a:r>
-              <a:rPr lang="en-US"/>
+              <a:rPr lang="en-US" dirty="0"/>
               <a:t>Third level</a:t>
             </a:r>
           </a:p>
           <a:p>
             <a:pPr lvl="3"/>
             <a:r>
-              <a:rPr lang="en-US"/>
+              <a:rPr lang="en-US" dirty="0"/>
               <a:t>Fourth level</a:t>
             </a:r>
           </a:p>
           <a:p>
             <a:pPr lvl="4"/>
             <a:r>
-              <a:rPr lang="en-US"/>
+              <a:rPr lang="en-US" dirty="0"/>
               <a:t>Fifth level</a:t>
             </a:r>
           </a:p>
@@ -1626,11 +1670,13 @@
           </a:xfrm>
         </p:spPr>
         <p:txBody>
-          <a:bodyPr anchor="b"/>
+          <a:bodyPr anchor="b">
+            <a:normAutofit/>
+          </a:bodyPr>
           <a:lstStyle>
             <a:lvl1pPr marL="0" indent="0">
               <a:buNone/>
-              <a:defRPr sz="1800" b="1"/>
+              <a:defRPr sz="1600" b="1"/>
             </a:lvl1pPr>
             <a:lvl2pPr marL="342900" indent="0">
               <a:buNone/>
@@ -1668,7 +1714,7 @@
           <a:p>
             <a:pPr lvl="0"/>
             <a:r>
-              <a:rPr lang="en-US"/>
+              <a:rPr lang="en-US" dirty="0"/>
               <a:t>Click to edit Master text styles</a:t>
             </a:r>
           </a:p>
@@ -1691,22 +1737,24 @@
           </a:xfrm>
         </p:spPr>
         <p:txBody>
-          <a:bodyPr/>
+          <a:bodyPr>
+            <a:normAutofit/>
+          </a:bodyPr>
           <a:lstStyle>
             <a:lvl1pPr>
-              <a:defRPr sz="1800"/>
+              <a:defRPr sz="1400"/>
             </a:lvl1pPr>
             <a:lvl2pPr>
-              <a:defRPr sz="1500"/>
+              <a:defRPr sz="1200"/>
             </a:lvl2pPr>
             <a:lvl3pPr>
-              <a:defRPr sz="1350"/>
+              <a:defRPr sz="1100"/>
             </a:lvl3pPr>
             <a:lvl4pPr>
-              <a:defRPr sz="1200"/>
+              <a:defRPr sz="1050"/>
             </a:lvl4pPr>
             <a:lvl5pPr>
-              <a:defRPr sz="1200"/>
+              <a:defRPr sz="1050"/>
             </a:lvl5pPr>
             <a:lvl6pPr>
               <a:defRPr sz="1200"/>
@@ -1724,35 +1772,35 @@
           <a:p>
             <a:pPr lvl="0"/>
             <a:r>
-              <a:rPr lang="en-US"/>
+              <a:rPr lang="en-US" dirty="0"/>
               <a:t>Click to edit Master text styles</a:t>
             </a:r>
           </a:p>
           <a:p>
             <a:pPr lvl="1"/>
             <a:r>
-              <a:rPr lang="en-US"/>
+              <a:rPr lang="en-US" dirty="0"/>
               <a:t>Second level</a:t>
             </a:r>
           </a:p>
           <a:p>
             <a:pPr lvl="2"/>
             <a:r>
-              <a:rPr lang="en-US"/>
+              <a:rPr lang="en-US" dirty="0"/>
               <a:t>Third level</a:t>
             </a:r>
           </a:p>
           <a:p>
             <a:pPr lvl="3"/>
             <a:r>
-              <a:rPr lang="en-US"/>
+              <a:rPr lang="en-US" dirty="0"/>
               <a:t>Fourth level</a:t>
             </a:r>
           </a:p>
           <a:p>
             <a:pPr lvl="4"/>
             <a:r>
-              <a:rPr lang="en-US"/>
+              <a:rPr lang="en-US" dirty="0"/>
               <a:t>Fifth level</a:t>
             </a:r>
           </a:p>
@@ -1775,7 +1823,7 @@
           <a:p>
             <a:fld id="{241EB5C9-1307-BA42-ABA2-0BC069CD8E7F}" type="datetimeFigureOut">
               <a:rPr lang="en-US" smtClean="0"/>
-              <a:t>1/2/22</a:t>
+              <a:t>2/25/2024</a:t>
             </a:fld>
             <a:endParaRPr lang="en-US"/>
           </a:p>
@@ -1892,7 +1940,7 @@
           <a:p>
             <a:fld id="{241EB5C9-1307-BA42-ABA2-0BC069CD8E7F}" type="datetimeFigureOut">
               <a:rPr lang="en-US" smtClean="0"/>
-              <a:t>1/2/22</a:t>
+              <a:t>2/25/2024</a:t>
             </a:fld>
             <a:endParaRPr lang="en-US"/>
           </a:p>
@@ -1987,7 +2035,7 @@
           <a:p>
             <a:fld id="{241EB5C9-1307-BA42-ABA2-0BC069CD8E7F}" type="datetimeFigureOut">
               <a:rPr lang="en-US" smtClean="0"/>
-              <a:t>1/2/22</a:t>
+              <a:t>2/25/2024</a:t>
             </a:fld>
             <a:endParaRPr lang="en-US"/>
           </a:p>
@@ -2262,7 +2310,7 @@
           <a:p>
             <a:fld id="{241EB5C9-1307-BA42-ABA2-0BC069CD8E7F}" type="datetimeFigureOut">
               <a:rPr lang="en-US" smtClean="0"/>
-              <a:t>1/2/22</a:t>
+              <a:t>2/25/2024</a:t>
             </a:fld>
             <a:endParaRPr lang="en-US"/>
           </a:p>
@@ -2514,7 +2562,7 @@
           <a:p>
             <a:fld id="{241EB5C9-1307-BA42-ABA2-0BC069CD8E7F}" type="datetimeFigureOut">
               <a:rPr lang="en-US" smtClean="0"/>
-              <a:t>1/2/22</a:t>
+              <a:t>2/25/2024</a:t>
             </a:fld>
             <a:endParaRPr lang="en-US"/>
           </a:p>
@@ -2623,7 +2671,7 @@
           <a:lstStyle/>
           <a:p>
             <a:r>
-              <a:rPr lang="en-US"/>
+              <a:rPr dirty="0" lang="en-US"/>
               <a:t>Click to edit Master title style</a:t>
             </a:r>
           </a:p>
@@ -2656,35 +2704,35 @@
           <a:p>
             <a:pPr lvl="0"/>
             <a:r>
-              <a:rPr lang="en-US"/>
+              <a:rPr dirty="0" lang="en-US"/>
               <a:t>Click to edit Master text styles</a:t>
             </a:r>
           </a:p>
           <a:p>
             <a:pPr lvl="1"/>
             <a:r>
-              <a:rPr lang="en-US"/>
+              <a:rPr dirty="0" lang="en-US"/>
               <a:t>Second level</a:t>
             </a:r>
           </a:p>
           <a:p>
             <a:pPr lvl="2"/>
             <a:r>
-              <a:rPr lang="en-US"/>
+              <a:rPr dirty="0" lang="en-US"/>
               <a:t>Third level</a:t>
             </a:r>
           </a:p>
           <a:p>
             <a:pPr lvl="3"/>
             <a:r>
-              <a:rPr lang="en-US"/>
+              <a:rPr dirty="0" lang="en-US"/>
               <a:t>Fourth level</a:t>
             </a:r>
           </a:p>
           <a:p>
             <a:pPr lvl="4"/>
             <a:r>
-              <a:rPr lang="en-US"/>
+              <a:rPr dirty="0" lang="en-US"/>
               <a:t>Fifth level</a:t>
             </a:r>
           </a:p>
@@ -2725,7 +2773,7 @@
           <a:p>
             <a:fld id="{241EB5C9-1307-BA42-ABA2-0BC069CD8E7F}" type="datetimeFigureOut">
               <a:rPr lang="en-US" smtClean="0"/>
-              <a:t>1/2/22</a:t>
+              <a:t>2/25/2024</a:t>
             </a:fld>
             <a:endParaRPr lang="en-US"/>
           </a:p>
@@ -2837,13 +2885,13 @@
           <a:spcPct val="0"/>
         </a:spcBef>
         <a:buNone/>
-        <a:defRPr kern="1200" sz="3300">
+        <a:defRPr kern="1200" sz="2000">
           <a:solidFill>
             <a:schemeClr val="tx1"/>
           </a:solidFill>
-          <a:latin typeface="+mj-lt"/>
+          <a:latin charset="0" panose="020B0604020202020204" pitchFamily="34" typeface="Helvetica"/>
           <a:ea typeface="+mj-ea"/>
-          <a:cs typeface="+mj-cs"/>
+          <a:cs charset="0" panose="020B0604020202020204" pitchFamily="34" typeface="Helvetica"/>
         </a:defRPr>
       </a:lvl1pPr>
     </p:titleStyle>
@@ -2854,13 +2902,13 @@
         </a:spcBef>
         <a:buFont typeface="Arial"/>
         <a:buChar char="•"/>
-        <a:defRPr kern="1200" sz="2400">
+        <a:defRPr kern="1200" sz="1600">
           <a:solidFill>
             <a:schemeClr val="tx1"/>
           </a:solidFill>
-          <a:latin typeface="+mn-lt"/>
+          <a:latin charset="0" panose="020B0604020202020204" pitchFamily="34" typeface="Helvetica"/>
           <a:ea typeface="+mn-ea"/>
-          <a:cs typeface="+mn-cs"/>
+          <a:cs charset="0" panose="020B0604020202020204" pitchFamily="34" typeface="Helvetica"/>
         </a:defRPr>
       </a:lvl1pPr>
       <a:lvl2pPr algn="l" defTabSz="342900" eaLnBrk="1" hangingPunct="1" indent="-342900" latinLnBrk="0" marL="685800" rtl="0">
@@ -2869,13 +2917,13 @@
         </a:spcBef>
         <a:buFont typeface="Arial"/>
         <a:buChar char="–"/>
-        <a:defRPr kern="1200" sz="2100">
+        <a:defRPr kern="1200" sz="1600">
           <a:solidFill>
             <a:schemeClr val="tx1"/>
           </a:solidFill>
-          <a:latin typeface="+mn-lt"/>
+          <a:latin charset="0" panose="020B0604020202020204" pitchFamily="34" typeface="Helvetica"/>
           <a:ea typeface="+mn-ea"/>
-          <a:cs typeface="+mn-cs"/>
+          <a:cs charset="0" panose="020B0604020202020204" pitchFamily="34" typeface="Helvetica"/>
         </a:defRPr>
       </a:lvl2pPr>
       <a:lvl3pPr algn="l" defTabSz="342900" eaLnBrk="1" hangingPunct="1" indent="-342900" latinLnBrk="0" marL="1028700" rtl="0">
@@ -2884,13 +2932,13 @@
         </a:spcBef>
         <a:buFont typeface="Arial"/>
         <a:buChar char="•"/>
-        <a:defRPr kern="1200" sz="1800">
+        <a:defRPr kern="1200" sz="1200">
           <a:solidFill>
             <a:schemeClr val="tx1"/>
           </a:solidFill>
-          <a:latin typeface="+mn-lt"/>
+          <a:latin charset="0" panose="020B0604020202020204" pitchFamily="34" typeface="Helvetica"/>
           <a:ea typeface="+mn-ea"/>
-          <a:cs typeface="+mn-cs"/>
+          <a:cs charset="0" panose="020B0604020202020204" pitchFamily="34" typeface="Helvetica"/>
         </a:defRPr>
       </a:lvl3pPr>
       <a:lvl4pPr algn="l" defTabSz="342900" eaLnBrk="1" hangingPunct="1" indent="-342900" latinLnBrk="0" marL="1371600" rtl="0">
@@ -2899,13 +2947,13 @@
         </a:spcBef>
         <a:buFont typeface="Arial"/>
         <a:buChar char="–"/>
-        <a:defRPr kern="1200" sz="1500">
+        <a:defRPr kern="1200" sz="1100">
           <a:solidFill>
             <a:schemeClr val="tx1"/>
           </a:solidFill>
-          <a:latin typeface="+mn-lt"/>
+          <a:latin charset="0" panose="020B0604020202020204" pitchFamily="34" typeface="Helvetica"/>
           <a:ea typeface="+mn-ea"/>
-          <a:cs typeface="+mn-cs"/>
+          <a:cs charset="0" panose="020B0604020202020204" pitchFamily="34" typeface="Helvetica"/>
         </a:defRPr>
       </a:lvl4pPr>
       <a:lvl5pPr algn="l" defTabSz="342900" eaLnBrk="1" hangingPunct="1" indent="-342900" latinLnBrk="0" marL="1714500" rtl="0">
@@ -2914,13 +2962,13 @@
         </a:spcBef>
         <a:buFont typeface="Arial"/>
         <a:buChar char="»"/>
-        <a:defRPr kern="1200" sz="1500">
+        <a:defRPr kern="1200" sz="1100">
           <a:solidFill>
             <a:schemeClr val="tx1"/>
           </a:solidFill>
-          <a:latin typeface="+mn-lt"/>
+          <a:latin charset="0" panose="020B0604020202020204" pitchFamily="34" typeface="Helvetica"/>
           <a:ea typeface="+mn-ea"/>
-          <a:cs typeface="+mn-cs"/>
+          <a:cs charset="0" panose="020B0604020202020204" pitchFamily="34" typeface="Helvetica"/>
         </a:defRPr>
       </a:lvl5pPr>
       <a:lvl6pPr algn="l" defTabSz="342900" eaLnBrk="1" hangingPunct="1" indent="-342900" latinLnBrk="0" marL="2057400" rtl="0">
@@ -3125,7 +3173,7 @@
             </a:pPr>
             <a:r>
               <a:rPr/>
-              <a:t>Embedded</a:t>
+              <a:t>Title</a:t>
             </a:r>
           </a:p>
         </p:txBody>

</xml_diff>

<commit_message>
Deploying to gh-pages from @ w4bo/slides-markdown@3a7920542e976a80982fc71038300d3b5f57d072 🚀
</commit_message>
<xml_diff>
--- a/prova.pptx
+++ b/prova.pptx
@@ -3719,6 +3719,48 @@
               <a:t>Left column (Francia, Gallinucci, and Golfarelli 2024)</a:t>
             </a:r>
           </a:p>
+          <a:p>
+            <a:pPr lvl="0"/>
+            <a:r>
+              <a:rPr/>
+              <a:t>Nested level 1</a:t>
+            </a:r>
+          </a:p>
+          <a:p>
+            <a:pPr lvl="1"/>
+            <a:r>
+              <a:rPr/>
+              <a:t>Nested level 2</a:t>
+            </a:r>
+          </a:p>
+          <a:p>
+            <a:pPr lvl="2"/>
+            <a:r>
+              <a:rPr/>
+              <a:t>Nested level 3</a:t>
+            </a:r>
+          </a:p>
+          <a:p>
+            <a:pPr lvl="2"/>
+            <a:r>
+              <a:rPr/>
+              <a:t>Nested level 3</a:t>
+            </a:r>
+          </a:p>
+          <a:p>
+            <a:pPr lvl="1"/>
+            <a:r>
+              <a:rPr/>
+              <a:t>Nested level 2</a:t>
+            </a:r>
+          </a:p>
+          <a:p>
+            <a:pPr lvl="0"/>
+            <a:r>
+              <a:rPr/>
+              <a:t>Nested level 1</a:t>
+            </a:r>
+          </a:p>
         </p:txBody>
       </p:sp>
       <p:sp>
@@ -3742,6 +3784,48 @@
             <a:r>
               <a:rPr/>
               <a:t>Right column</a:t>
+            </a:r>
+          </a:p>
+          <a:p>
+            <a:pPr lvl="0"/>
+            <a:r>
+              <a:rPr/>
+              <a:t>Nested level 1</a:t>
+            </a:r>
+          </a:p>
+          <a:p>
+            <a:pPr lvl="1"/>
+            <a:r>
+              <a:rPr/>
+              <a:t>Nested level 2</a:t>
+            </a:r>
+          </a:p>
+          <a:p>
+            <a:pPr lvl="2"/>
+            <a:r>
+              <a:rPr/>
+              <a:t>Nested level 3</a:t>
+            </a:r>
+          </a:p>
+          <a:p>
+            <a:pPr lvl="2"/>
+            <a:r>
+              <a:rPr/>
+              <a:t>Nested level 3</a:t>
+            </a:r>
+          </a:p>
+          <a:p>
+            <a:pPr lvl="1"/>
+            <a:r>
+              <a:rPr/>
+              <a:t>Nested level 2</a:t>
+            </a:r>
+          </a:p>
+          <a:p>
+            <a:pPr lvl="0"/>
+            <a:r>
+              <a:rPr/>
+              <a:t>Nested level 1</a:t>
             </a:r>
           </a:p>
         </p:txBody>

</xml_diff>

<commit_message>
Deploying to gh-pages from @ w4bo/slides-markdown@0c59ca8dbb080d43a6300ed17945b81435d47eac 🚀
</commit_message>
<xml_diff>
--- a/prova.pptx
+++ b/prova.pptx
@@ -4048,7 +4048,12 @@
             <p:ph type="title"/>
           </p:nvPr>
         </p:nvSpPr>
-        <p:spPr/>
+        <p:spPr>
+          <a:xfrm>
+            <a:off x="457201" y="204787"/>
+            <a:ext cx="3008313" cy="871538"/>
+          </a:xfrm>
+        </p:spPr>
         <p:txBody>
           <a:bodyPr/>
           <a:lstStyle/>
@@ -4065,12 +4070,12 @@
       </p:sp>
       <p:sp>
         <p:nvSpPr>
-          <p:cNvPr id="3" name="Content Placeholder 2"/>
-          <p:cNvSpPr>
-            <a:spLocks noGrp="1"/>
-          </p:cNvSpPr>
-          <p:nvPr>
-            <p:ph idx="1"/>
+          <p:cNvPr id="4" name="Text Placeholder 3"/>
+          <p:cNvSpPr>
+            <a:spLocks noGrp="1"/>
+          </p:cNvSpPr>
+          <p:nvPr>
+            <p:ph idx="2" sz="half" type="body"/>
           </p:nvPr>
         </p:nvSpPr>
         <p:spPr/>
@@ -4125,8 +4130,8 @@
         </p:blipFill>
         <p:spPr bwMode="auto">
           <a:xfrm>
-            <a:off x="2413000" y="1193800"/>
-            <a:ext cx="4318000" cy="2882900"/>
+            <a:off x="3568700" y="431800"/>
+            <a:ext cx="5105400" cy="3403600"/>
           </a:xfrm>
           <a:prstGeom prst="rect">
             <a:avLst/>
@@ -4147,8 +4152,8 @@
         </p:nvSpPr>
         <p:spPr>
           <a:xfrm>
-            <a:off x="457200" y="4076700"/>
-            <a:ext cx="8229600" cy="508000"/>
+            <a:off x="3568700" y="4076700"/>
+            <a:ext cx="5105400" cy="508000"/>
           </a:xfrm>
           <a:prstGeom prst="rect">
             <a:avLst/>

</xml_diff>

<commit_message>
Deploying to gh-pages from @ w4bo/slides-markdown@ba589944c19a5ed2e7ed9d27318dcce0bc85a561 🚀
</commit_message>
<xml_diff>
--- a/prova.pptx
+++ b/prova.pptx
@@ -4116,7 +4116,7 @@
       </p:sp>
       <p:pic>
         <p:nvPicPr>
-          <p:cNvPr descr="https://github.com/w4bo/img-dump/assets/18005592/edb97112-e9bb-45f8-8f2c-3121ebd80b7d.png" id="0" name="Picture 1"/>
+          <p:cNvPr descr="image.png" id="0" name="Picture 1"/>
           <p:cNvPicPr>
             <a:picLocks noGrp="1" noChangeAspect="1"/>
           </p:cNvPicPr>
@@ -4130,8 +4130,8 @@
         </p:blipFill>
         <p:spPr bwMode="auto">
           <a:xfrm>
-            <a:off x="3568700" y="431800"/>
-            <a:ext cx="5105400" cy="3403600"/>
+            <a:off x="3657600" y="203200"/>
+            <a:ext cx="4927600" cy="3873500"/>
           </a:xfrm>
           <a:prstGeom prst="rect">
             <a:avLst/>

</xml_diff>